<commit_message>
Update Publishing to GeoServer using PostgreSQL.pptx
</commit_message>
<xml_diff>
--- a/Publishing to GeoServer using PostgreSQL.pptx
+++ b/Publishing to GeoServer using PostgreSQL.pptx
@@ -16,9 +16,9 @@
     <p:sldId id="264" r:id="rId10"/>
     <p:sldId id="265" r:id="rId11"/>
     <p:sldId id="266" r:id="rId12"/>
-    <p:sldId id="269" r:id="rId13"/>
-    <p:sldId id="267" r:id="rId14"/>
-    <p:sldId id="268" r:id="rId15"/>
+    <p:sldId id="267" r:id="rId13"/>
+    <p:sldId id="268" r:id="rId14"/>
+    <p:sldId id="269" r:id="rId15"/>
     <p:sldId id="270" r:id="rId16"/>
   </p:sldIdLst>
   <p:sldSz cx="12192000" cy="6858000"/>
@@ -118,6 +118,11 @@
       </a:defRPr>
     </a:lvl9pPr>
   </p:defaultTextStyle>
+  <p:extLst>
+    <p:ext uri="{EFAFB233-063F-42B5-8137-9DF3F51BA10A}">
+      <p15:sldGuideLst xmlns:p15="http://schemas.microsoft.com/office/powerpoint/2012/main"/>
+    </p:ext>
+  </p:extLst>
 </p:presentation>
 </file>
 
@@ -4172,7 +4177,7 @@
           <a:p>
             <a:r>
               <a:rPr lang="en-US" dirty="0" smtClean="0"/>
-              <a:t>Previewing your Layer</a:t>
+              <a:t>Publishing (part 1)</a:t>
             </a:r>
             <a:endParaRPr lang="en-US" dirty="0"/>
           </a:p>
@@ -4180,7 +4185,7 @@
       </p:sp>
       <p:pic>
         <p:nvPicPr>
-          <p:cNvPr id="5" name="Content Placeholder 4"/>
+          <p:cNvPr id="7" name="Content Placeholder 6"/>
           <p:cNvPicPr>
             <a:picLocks noGrp="1" noChangeAspect="1"/>
           </p:cNvPicPr>
@@ -4188,142 +4193,75 @@
             <p:ph sz="half" idx="1"/>
           </p:nvPr>
         </p:nvPicPr>
-        <p:blipFill rotWithShape="1">
+        <p:blipFill>
           <a:blip r:embed="rId2"/>
-          <a:srcRect t="14537" r="82487"/>
-          <a:stretch/>
+          <a:stretch>
+            <a:fillRect/>
+          </a:stretch>
         </p:blipFill>
         <p:spPr>
           <a:xfrm>
-            <a:off x="838200" y="1999045"/>
-            <a:ext cx="2969029" cy="3496419"/>
+            <a:off x="2094316" y="1846263"/>
+            <a:ext cx="2944005" cy="4022725"/>
           </a:xfrm>
           <a:prstGeom prst="rect">
             <a:avLst/>
           </a:prstGeom>
         </p:spPr>
       </p:pic>
-      <p:pic>
-        <p:nvPicPr>
-          <p:cNvPr id="6" name="Content Placeholder 5"/>
-          <p:cNvPicPr>
-            <a:picLocks noGrp="1" noChangeAspect="1"/>
-          </p:cNvPicPr>
+      <p:sp>
+        <p:nvSpPr>
+          <p:cNvPr id="4" name="Content Placeholder 3"/>
+          <p:cNvSpPr>
+            <a:spLocks noGrp="1"/>
+          </p:cNvSpPr>
           <p:nvPr>
             <p:ph sz="half" idx="2"/>
           </p:nvPr>
-        </p:nvPicPr>
-        <p:blipFill rotWithShape="1">
-          <a:blip r:embed="rId2"/>
-          <a:srcRect l="18550" t="4862"/>
-          <a:stretch/>
-        </p:blipFill>
-        <p:spPr>
-          <a:xfrm>
-            <a:off x="4272740" y="2294313"/>
-            <a:ext cx="7225138" cy="2036617"/>
-          </a:xfrm>
-          <a:prstGeom prst="rect">
-            <a:avLst/>
-          </a:prstGeom>
-        </p:spPr>
-      </p:pic>
-      <p:sp>
-        <p:nvSpPr>
-          <p:cNvPr id="7" name="Oval 6"/>
-          <p:cNvSpPr/>
-          <p:nvPr/>
-        </p:nvSpPr>
-        <p:spPr>
-          <a:xfrm flipV="1">
-            <a:off x="780009" y="3823855"/>
-            <a:ext cx="2079569" cy="332509"/>
-          </a:xfrm>
-          <a:prstGeom prst="ellipse">
-            <a:avLst/>
-          </a:prstGeom>
-          <a:noFill/>
-          <a:ln w="28575">
-            <a:solidFill>
-              <a:srgbClr val="FF0000"/>
-            </a:solidFill>
-          </a:ln>
-        </p:spPr>
-        <p:style>
-          <a:lnRef idx="2">
-            <a:schemeClr val="accent1">
-              <a:shade val="50000"/>
-            </a:schemeClr>
-          </a:lnRef>
-          <a:fillRef idx="1">
-            <a:schemeClr val="accent1"/>
-          </a:fillRef>
-          <a:effectRef idx="0">
-            <a:schemeClr val="accent1"/>
-          </a:effectRef>
-          <a:fontRef idx="minor">
-            <a:schemeClr val="lt1"/>
-          </a:fontRef>
-        </p:style>
-        <p:txBody>
-          <a:bodyPr rtlCol="0" anchor="ctr"/>
-          <a:lstStyle/>
-          <a:p>
-            <a:pPr algn="ctr"/>
-            <a:endParaRPr lang="en-US"/>
-          </a:p>
-        </p:txBody>
-      </p:sp>
-      <p:sp>
-        <p:nvSpPr>
-          <p:cNvPr id="8" name="Oval 7"/>
-          <p:cNvSpPr/>
-          <p:nvPr/>
-        </p:nvSpPr>
-        <p:spPr>
-          <a:xfrm flipV="1">
-            <a:off x="8761615" y="3740724"/>
-            <a:ext cx="665018" cy="249381"/>
-          </a:xfrm>
-          <a:prstGeom prst="ellipse">
-            <a:avLst/>
-          </a:prstGeom>
-          <a:noFill/>
-          <a:ln w="28575">
-            <a:solidFill>
-              <a:srgbClr val="FF0000"/>
-            </a:solidFill>
-          </a:ln>
-        </p:spPr>
-        <p:style>
-          <a:lnRef idx="2">
-            <a:schemeClr val="accent1">
-              <a:shade val="50000"/>
-            </a:schemeClr>
-          </a:lnRef>
-          <a:fillRef idx="1">
-            <a:schemeClr val="accent1"/>
-          </a:fillRef>
-          <a:effectRef idx="0">
-            <a:schemeClr val="accent1"/>
-          </a:effectRef>
-          <a:fontRef idx="minor">
-            <a:schemeClr val="lt1"/>
-          </a:fontRef>
-        </p:style>
-        <p:txBody>
-          <a:bodyPr rtlCol="0" anchor="ctr"/>
-          <a:lstStyle/>
-          <a:p>
-            <a:pPr algn="ctr"/>
-            <a:endParaRPr lang="en-US"/>
+        </p:nvSpPr>
+        <p:spPr/>
+        <p:txBody>
+          <a:bodyPr/>
+          <a:lstStyle/>
+          <a:p>
+            <a:r>
+              <a:rPr lang="en-US" dirty="0" smtClean="0"/>
+              <a:t>Change the name now if you want. This is how the web map application will request the layer.</a:t>
+            </a:r>
+          </a:p>
+          <a:p>
+            <a:r>
+              <a:rPr lang="en-US" dirty="0" smtClean="0"/>
+              <a:t>Optional</a:t>
+            </a:r>
+          </a:p>
+          <a:p>
+            <a:pPr lvl="1"/>
+            <a:r>
+              <a:rPr lang="en-US" dirty="0" smtClean="0"/>
+              <a:t>Title </a:t>
+            </a:r>
+          </a:p>
+          <a:p>
+            <a:pPr lvl="1"/>
+            <a:r>
+              <a:rPr lang="en-US" dirty="0" smtClean="0"/>
+              <a:t>Abstract</a:t>
+            </a:r>
+          </a:p>
+          <a:p>
+            <a:pPr lvl="1"/>
+            <a:r>
+              <a:rPr lang="en-US" dirty="0" smtClean="0"/>
+              <a:t>Keywords</a:t>
+            </a:r>
           </a:p>
         </p:txBody>
       </p:sp>
     </p:spTree>
     <p:extLst>
       <p:ext uri="{BB962C8B-B14F-4D97-AF65-F5344CB8AC3E}">
-        <p14:creationId xmlns:p14="http://schemas.microsoft.com/office/powerpoint/2010/main" val="2783407025"/>
+        <p14:creationId xmlns:p14="http://schemas.microsoft.com/office/powerpoint/2010/main" val="728068006"/>
       </p:ext>
     </p:extLst>
   </p:cSld>
@@ -4360,14 +4298,19 @@
             <p:ph type="title"/>
           </p:nvPr>
         </p:nvSpPr>
-        <p:spPr/>
+        <p:spPr>
+          <a:xfrm>
+            <a:off x="1097280" y="286603"/>
+            <a:ext cx="10058400" cy="1271609"/>
+          </a:xfrm>
+        </p:spPr>
         <p:txBody>
           <a:bodyPr/>
           <a:lstStyle/>
           <a:p>
             <a:r>
               <a:rPr lang="en-US" dirty="0" smtClean="0"/>
-              <a:t>Publishing (part 1)</a:t>
+              <a:t>Publishing (part 2)</a:t>
             </a:r>
             <a:endParaRPr lang="en-US" dirty="0"/>
           </a:p>
@@ -4375,7 +4318,7 @@
       </p:sp>
       <p:pic>
         <p:nvPicPr>
-          <p:cNvPr id="7" name="Content Placeholder 6"/>
+          <p:cNvPr id="9" name="Content Placeholder 8"/>
           <p:cNvPicPr>
             <a:picLocks noGrp="1" noChangeAspect="1"/>
           </p:cNvPicPr>
@@ -4391,8 +4334,8 @@
         </p:blipFill>
         <p:spPr>
           <a:xfrm>
-            <a:off x="2094316" y="1846263"/>
-            <a:ext cx="2944005" cy="4022725"/>
+            <a:off x="1230981" y="1737341"/>
+            <a:ext cx="4024530" cy="4795698"/>
           </a:xfrm>
           <a:prstGeom prst="rect">
             <a:avLst/>
@@ -4416,42 +4359,42 @@
           <a:p>
             <a:r>
               <a:rPr lang="en-US" dirty="0" smtClean="0"/>
-              <a:t>Change the name now if you want. This is how the web map application will request the layer.</a:t>
+              <a:t>Coordinate Reference System needs to be what the actual dataset was loaded in. </a:t>
             </a:r>
           </a:p>
           <a:p>
             <a:r>
               <a:rPr lang="en-US" dirty="0" smtClean="0"/>
-              <a:t>Optional</a:t>
+              <a:t>Bounding Boxes</a:t>
             </a:r>
           </a:p>
           <a:p>
             <a:pPr lvl="1"/>
             <a:r>
               <a:rPr lang="en-US" dirty="0" smtClean="0"/>
-              <a:t>Title </a:t>
+              <a:t>Click compute from data</a:t>
             </a:r>
           </a:p>
           <a:p>
             <a:pPr lvl="1"/>
             <a:r>
               <a:rPr lang="en-US" dirty="0" smtClean="0"/>
-              <a:t>Abstract</a:t>
-            </a:r>
-          </a:p>
-          <a:p>
-            <a:pPr lvl="1"/>
+              <a:t>Click compute from native bounds</a:t>
+            </a:r>
+          </a:p>
+          <a:p>
             <a:r>
               <a:rPr lang="en-US" dirty="0" smtClean="0"/>
-              <a:t>Keywords</a:t>
-            </a:r>
+              <a:t>Click Save at the bottom</a:t>
+            </a:r>
+            <a:endParaRPr lang="en-US" dirty="0"/>
           </a:p>
         </p:txBody>
       </p:sp>
     </p:spTree>
     <p:extLst>
       <p:ext uri="{BB962C8B-B14F-4D97-AF65-F5344CB8AC3E}">
-        <p14:creationId xmlns:p14="http://schemas.microsoft.com/office/powerpoint/2010/main" val="728068006"/>
+        <p14:creationId xmlns:p14="http://schemas.microsoft.com/office/powerpoint/2010/main" val="4094816168"/>
       </p:ext>
     </p:extLst>
   </p:cSld>
@@ -4488,19 +4431,14 @@
             <p:ph type="title"/>
           </p:nvPr>
         </p:nvSpPr>
-        <p:spPr>
-          <a:xfrm>
-            <a:off x="1097280" y="286603"/>
-            <a:ext cx="10058400" cy="1271609"/>
-          </a:xfrm>
-        </p:spPr>
+        <p:spPr/>
         <p:txBody>
           <a:bodyPr/>
           <a:lstStyle/>
           <a:p>
             <a:r>
               <a:rPr lang="en-US" dirty="0" smtClean="0"/>
-              <a:t>Publishing (part 2)</a:t>
+              <a:t>Previewing your Layer</a:t>
             </a:r>
             <a:endParaRPr lang="en-US" dirty="0"/>
           </a:p>
@@ -4508,7 +4446,7 @@
       </p:sp>
       <p:pic>
         <p:nvPicPr>
-          <p:cNvPr id="9" name="Content Placeholder 8"/>
+          <p:cNvPr id="5" name="Content Placeholder 4"/>
           <p:cNvPicPr>
             <a:picLocks noGrp="1" noChangeAspect="1"/>
           </p:cNvPicPr>
@@ -4516,75 +4454,142 @@
             <p:ph sz="half" idx="1"/>
           </p:nvPr>
         </p:nvPicPr>
-        <p:blipFill>
+        <p:blipFill rotWithShape="1">
           <a:blip r:embed="rId2"/>
-          <a:stretch>
-            <a:fillRect/>
-          </a:stretch>
+          <a:srcRect t="14537" r="82487"/>
+          <a:stretch/>
         </p:blipFill>
         <p:spPr>
           <a:xfrm>
-            <a:off x="1230981" y="1737341"/>
-            <a:ext cx="4024530" cy="4795698"/>
+            <a:off x="838200" y="1999045"/>
+            <a:ext cx="2969029" cy="3496419"/>
           </a:xfrm>
           <a:prstGeom prst="rect">
             <a:avLst/>
           </a:prstGeom>
         </p:spPr>
       </p:pic>
-      <p:sp>
-        <p:nvSpPr>
-          <p:cNvPr id="4" name="Content Placeholder 3"/>
-          <p:cNvSpPr>
-            <a:spLocks noGrp="1"/>
-          </p:cNvSpPr>
+      <p:pic>
+        <p:nvPicPr>
+          <p:cNvPr id="6" name="Content Placeholder 5"/>
+          <p:cNvPicPr>
+            <a:picLocks noGrp="1" noChangeAspect="1"/>
+          </p:cNvPicPr>
           <p:nvPr>
             <p:ph sz="half" idx="2"/>
           </p:nvPr>
-        </p:nvSpPr>
-        <p:spPr/>
-        <p:txBody>
-          <a:bodyPr/>
-          <a:lstStyle/>
-          <a:p>
-            <a:r>
-              <a:rPr lang="en-US" dirty="0" smtClean="0"/>
-              <a:t>Coordinate Reference System needs to be what the actual dataset was loaded in. </a:t>
-            </a:r>
-          </a:p>
-          <a:p>
-            <a:r>
-              <a:rPr lang="en-US" dirty="0" smtClean="0"/>
-              <a:t>Bounding Boxes</a:t>
-            </a:r>
-          </a:p>
-          <a:p>
-            <a:pPr lvl="1"/>
-            <a:r>
-              <a:rPr lang="en-US" dirty="0" smtClean="0"/>
-              <a:t>Click compute from data</a:t>
-            </a:r>
-          </a:p>
-          <a:p>
-            <a:pPr lvl="1"/>
-            <a:r>
-              <a:rPr lang="en-US" dirty="0" smtClean="0"/>
-              <a:t>Click compute from native bounds</a:t>
-            </a:r>
-          </a:p>
-          <a:p>
-            <a:r>
-              <a:rPr lang="en-US" dirty="0" smtClean="0"/>
-              <a:t>Click Save at the bottom</a:t>
-            </a:r>
-            <a:endParaRPr lang="en-US" dirty="0"/>
+        </p:nvPicPr>
+        <p:blipFill rotWithShape="1">
+          <a:blip r:embed="rId2"/>
+          <a:srcRect l="18550" t="4862"/>
+          <a:stretch/>
+        </p:blipFill>
+        <p:spPr>
+          <a:xfrm>
+            <a:off x="4272740" y="2294313"/>
+            <a:ext cx="7225138" cy="2036617"/>
+          </a:xfrm>
+          <a:prstGeom prst="rect">
+            <a:avLst/>
+          </a:prstGeom>
+        </p:spPr>
+      </p:pic>
+      <p:sp>
+        <p:nvSpPr>
+          <p:cNvPr id="7" name="Oval 6"/>
+          <p:cNvSpPr/>
+          <p:nvPr/>
+        </p:nvSpPr>
+        <p:spPr>
+          <a:xfrm flipV="1">
+            <a:off x="780009" y="3823855"/>
+            <a:ext cx="2079569" cy="332509"/>
+          </a:xfrm>
+          <a:prstGeom prst="ellipse">
+            <a:avLst/>
+          </a:prstGeom>
+          <a:noFill/>
+          <a:ln w="28575">
+            <a:solidFill>
+              <a:srgbClr val="FF0000"/>
+            </a:solidFill>
+          </a:ln>
+        </p:spPr>
+        <p:style>
+          <a:lnRef idx="2">
+            <a:schemeClr val="accent1">
+              <a:shade val="50000"/>
+            </a:schemeClr>
+          </a:lnRef>
+          <a:fillRef idx="1">
+            <a:schemeClr val="accent1"/>
+          </a:fillRef>
+          <a:effectRef idx="0">
+            <a:schemeClr val="accent1"/>
+          </a:effectRef>
+          <a:fontRef idx="minor">
+            <a:schemeClr val="lt1"/>
+          </a:fontRef>
+        </p:style>
+        <p:txBody>
+          <a:bodyPr rtlCol="0" anchor="ctr"/>
+          <a:lstStyle/>
+          <a:p>
+            <a:pPr algn="ctr"/>
+            <a:endParaRPr lang="en-US"/>
+          </a:p>
+        </p:txBody>
+      </p:sp>
+      <p:sp>
+        <p:nvSpPr>
+          <p:cNvPr id="8" name="Oval 7"/>
+          <p:cNvSpPr/>
+          <p:nvPr/>
+        </p:nvSpPr>
+        <p:spPr>
+          <a:xfrm flipV="1">
+            <a:off x="8761615" y="4031673"/>
+            <a:ext cx="665018" cy="249381"/>
+          </a:xfrm>
+          <a:prstGeom prst="ellipse">
+            <a:avLst/>
+          </a:prstGeom>
+          <a:noFill/>
+          <a:ln w="28575">
+            <a:solidFill>
+              <a:srgbClr val="FF0000"/>
+            </a:solidFill>
+          </a:ln>
+        </p:spPr>
+        <p:style>
+          <a:lnRef idx="2">
+            <a:schemeClr val="accent1">
+              <a:shade val="50000"/>
+            </a:schemeClr>
+          </a:lnRef>
+          <a:fillRef idx="1">
+            <a:schemeClr val="accent1"/>
+          </a:fillRef>
+          <a:effectRef idx="0">
+            <a:schemeClr val="accent1"/>
+          </a:effectRef>
+          <a:fontRef idx="minor">
+            <a:schemeClr val="lt1"/>
+          </a:fontRef>
+        </p:style>
+        <p:txBody>
+          <a:bodyPr rtlCol="0" anchor="ctr"/>
+          <a:lstStyle/>
+          <a:p>
+            <a:pPr algn="ctr"/>
+            <a:endParaRPr lang="en-US"/>
           </a:p>
         </p:txBody>
       </p:sp>
     </p:spTree>
     <p:extLst>
       <p:ext uri="{BB962C8B-B14F-4D97-AF65-F5344CB8AC3E}">
-        <p14:creationId xmlns:p14="http://schemas.microsoft.com/office/powerpoint/2010/main" val="4094816168"/>
+        <p14:creationId xmlns:p14="http://schemas.microsoft.com/office/powerpoint/2010/main" val="2783407025"/>
       </p:ext>
     </p:extLst>
   </p:cSld>

</xml_diff>